<commit_message>
改step size dia_load 新增meeting pdf
</commit_message>
<xml_diff>
--- a/meeting/anchi_0124_meeting.pptx
+++ b/meeting/anchi_0124_meeting.pptx
@@ -258,7 +258,7 @@
             <a:fld id="{D877E232-5BD3-474B-93D4-BBE4BE861F87}" type="datetimeFigureOut">
               <a:rPr lang="zh-TW" altLang="en-US" smtClean="0"/>
               <a:pPr/>
-              <a:t>2024/1/23</a:t>
+              <a:t>2024/2/21</a:t>
             </a:fld>
             <a:endParaRPr lang="zh-TW" altLang="en-US"/>
           </a:p>
@@ -955,7 +955,7 @@
             <a:fld id="{82E6E325-F822-4212-9386-9D4612C75CEF}" type="datetime1">
               <a:rPr lang="zh-TW" altLang="en-US" smtClean="0"/>
               <a:pPr/>
-              <a:t>2024/1/23</a:t>
+              <a:t>2024/2/21</a:t>
             </a:fld>
             <a:endParaRPr lang="zh-TW" altLang="en-US"/>
           </a:p>
@@ -1101,7 +1101,7 @@
             <a:fld id="{89778465-DAD5-498D-AB4D-55D7C9B8665B}" type="datetime1">
               <a:rPr lang="zh-TW" altLang="en-US" smtClean="0"/>
               <a:pPr/>
-              <a:t>2024/1/23</a:t>
+              <a:t>2024/2/21</a:t>
             </a:fld>
             <a:endParaRPr lang="zh-TW" altLang="en-US"/>
           </a:p>
@@ -1280,7 +1280,7 @@
             <a:fld id="{70681225-2E08-4068-AF70-2DD867CA63A5}" type="datetime1">
               <a:rPr lang="zh-TW" altLang="en-US" smtClean="0"/>
               <a:pPr/>
-              <a:t>2024/1/23</a:t>
+              <a:t>2024/2/21</a:t>
             </a:fld>
             <a:endParaRPr lang="zh-TW" altLang="en-US"/>
           </a:p>
@@ -1415,7 +1415,7 @@
             <a:fld id="{34BD1461-E55A-4D82-BE17-51B51CBE1DD9}" type="datetime1">
               <a:rPr lang="zh-TW" altLang="en-US" smtClean="0"/>
               <a:pPr/>
-              <a:t>2024/1/23</a:t>
+              <a:t>2024/2/21</a:t>
             </a:fld>
             <a:endParaRPr lang="zh-TW" altLang="en-US"/>
           </a:p>
@@ -1799,7 +1799,7 @@
             <a:fld id="{50560A66-ECFC-4337-915D-48C9454D627A}" type="datetime1">
               <a:rPr lang="zh-TW" altLang="en-US" smtClean="0"/>
               <a:pPr/>
-              <a:t>2024/1/23</a:t>
+              <a:t>2024/2/21</a:t>
             </a:fld>
             <a:endParaRPr lang="zh-TW" altLang="en-US"/>
           </a:p>
@@ -2095,7 +2095,7 @@
             <a:fld id="{CFDC29B8-7A7D-4F55-BAE5-6A7151E1BCDB}" type="datetime1">
               <a:rPr lang="zh-TW" altLang="en-US" smtClean="0"/>
               <a:pPr/>
-              <a:t>2024/1/23</a:t>
+              <a:t>2024/2/21</a:t>
             </a:fld>
             <a:endParaRPr lang="zh-TW" altLang="en-US"/>
           </a:p>
@@ -2520,7 +2520,7 @@
             <a:fld id="{7D948231-0C7F-43D8-9B50-6B0CF2A67FFA}" type="datetime1">
               <a:rPr lang="zh-TW" altLang="en-US" smtClean="0"/>
               <a:pPr/>
-              <a:t>2024/1/23</a:t>
+              <a:t>2024/2/21</a:t>
             </a:fld>
             <a:endParaRPr lang="zh-TW" altLang="en-US"/>
           </a:p>
@@ -2638,7 +2638,7 @@
             <a:fld id="{EF418B44-EDFC-409F-93DD-EF5C89251185}" type="datetime1">
               <a:rPr lang="zh-TW" altLang="en-US" smtClean="0"/>
               <a:pPr/>
-              <a:t>2024/1/23</a:t>
+              <a:t>2024/2/21</a:t>
             </a:fld>
             <a:endParaRPr lang="zh-TW" altLang="en-US"/>
           </a:p>
@@ -2734,7 +2734,7 @@
             <a:fld id="{CC5F5369-9B42-4CFE-8058-BF22F9445AB6}" type="datetime1">
               <a:rPr lang="zh-TW" altLang="en-US" smtClean="0"/>
               <a:pPr/>
-              <a:t>2024/1/23</a:t>
+              <a:t>2024/2/21</a:t>
             </a:fld>
             <a:endParaRPr lang="zh-TW" altLang="en-US"/>
           </a:p>
@@ -3010,7 +3010,7 @@
             <a:fld id="{ECC6EB90-F6B3-43F2-B8ED-716935D380ED}" type="datetime1">
               <a:rPr lang="zh-TW" altLang="en-US" smtClean="0"/>
               <a:pPr/>
-              <a:t>2024/1/23</a:t>
+              <a:t>2024/2/21</a:t>
             </a:fld>
             <a:endParaRPr lang="zh-TW" altLang="en-US"/>
           </a:p>
@@ -3263,7 +3263,7 @@
             <a:fld id="{DB1525E1-F446-4E68-B769-0621D99AE5A5}" type="datetime1">
               <a:rPr lang="zh-TW" altLang="en-US" smtClean="0"/>
               <a:pPr/>
-              <a:t>2024/1/23</a:t>
+              <a:t>2024/2/21</a:t>
             </a:fld>
             <a:endParaRPr lang="zh-TW" altLang="en-US"/>
           </a:p>
@@ -3620,7 +3620,7 @@
             <a:fld id="{568A7A41-D8CA-466B-BE5A-95AC065E72BC}" type="datetime1">
               <a:rPr lang="zh-TW" altLang="en-US" smtClean="0"/>
               <a:pPr/>
-              <a:t>2024/1/23</a:t>
+              <a:t>2024/2/21</a:t>
             </a:fld>
             <a:endParaRPr lang="zh-TW" altLang="en-US"/>
           </a:p>
@@ -4143,7 +4143,7 @@
                 <a:cs typeface="Times New Roman" panose="02020603050405020304" pitchFamily="18" charset="0"/>
               </a:rPr>
               <a:pPr/>
-              <a:t>2024/1/23</a:t>
+              <a:t>2024/2/21</a:t>
             </a:fld>
             <a:endParaRPr lang="zh-TW" altLang="en-US">
               <a:latin typeface="Times New Roman" panose="02020603050405020304" pitchFamily="18" charset="0"/>
@@ -4263,7 +4263,7 @@
                 <a:cs typeface="Times New Roman" panose="02020603050405020304" pitchFamily="18" charset="0"/>
               </a:rPr>
               <a:pPr/>
-              <a:t>2024/1/23</a:t>
+              <a:t>2024/2/21</a:t>
             </a:fld>
             <a:endParaRPr lang="zh-TW" altLang="en-US">
               <a:latin typeface="Times New Roman" panose="02020603050405020304" pitchFamily="18" charset="0"/>
@@ -4916,7 +4916,7 @@
                 <a:cs typeface="Times New Roman" panose="02020603050405020304" pitchFamily="18" charset="0"/>
               </a:rPr>
               <a:pPr/>
-              <a:t>2024/1/23</a:t>
+              <a:t>2024/2/21</a:t>
             </a:fld>
             <a:endParaRPr lang="zh-TW" altLang="en-US">
               <a:latin typeface="Times New Roman" panose="02020603050405020304" pitchFamily="18" charset="0"/>
@@ -5140,7 +5140,7 @@
                 <a:cs typeface="Times New Roman" panose="02020603050405020304" pitchFamily="18" charset="0"/>
               </a:rPr>
               <a:pPr/>
-              <a:t>2024/1/23</a:t>
+              <a:t>2024/2/21</a:t>
             </a:fld>
             <a:endParaRPr lang="zh-TW" altLang="en-US">
               <a:latin typeface="Times New Roman" panose="02020603050405020304" pitchFamily="18" charset="0"/>
@@ -5248,7 +5248,7 @@
           <a:graphicData uri="http://schemas.openxmlformats.org/presentationml/2006/ole">
             <mc:AlternateContent xmlns:mc="http://schemas.openxmlformats.org/markup-compatibility/2006">
               <mc:Choice xmlns:v="urn:schemas-microsoft-com:vml" Requires="v">
-                <p:oleObj spid="_x0000_s14385" name="Equation" r:id="rId3" imgW="4368600" imgH="2793960" progId="Equation.DSMT4">
+                <p:oleObj spid="_x0000_s14386" name="Equation" r:id="rId3" imgW="4368600" imgH="2793960" progId="Equation.DSMT4">
                   <p:embed/>
                 </p:oleObj>
               </mc:Choice>
@@ -5375,7 +5375,7 @@
                 <a:cs typeface="Times New Roman" panose="02020603050405020304" pitchFamily="18" charset="0"/>
               </a:rPr>
               <a:pPr/>
-              <a:t>2024/1/23</a:t>
+              <a:t>2024/2/21</a:t>
             </a:fld>
             <a:endParaRPr lang="zh-TW" altLang="en-US">
               <a:latin typeface="Times New Roman" panose="02020603050405020304" pitchFamily="18" charset="0"/>
@@ -5483,7 +5483,7 @@
           <a:graphicData uri="http://schemas.openxmlformats.org/presentationml/2006/ole">
             <mc:AlternateContent xmlns:mc="http://schemas.openxmlformats.org/markup-compatibility/2006">
               <mc:Choice xmlns:v="urn:schemas-microsoft-com:vml" Requires="v">
-                <p:oleObj spid="_x0000_s16392" name="Equation" r:id="rId3" imgW="3136680" imgH="2184120" progId="Equation.DSMT4">
+                <p:oleObj spid="_x0000_s16393" name="Equation" r:id="rId3" imgW="3136680" imgH="2184120" progId="Equation.DSMT4">
                   <p:embed/>
                 </p:oleObj>
               </mc:Choice>
@@ -5615,7 +5615,7 @@
                 <a:cs typeface="Times New Roman" panose="02020603050405020304" pitchFamily="18" charset="0"/>
               </a:rPr>
               <a:pPr/>
-              <a:t>2024/1/23</a:t>
+              <a:t>2024/2/21</a:t>
             </a:fld>
             <a:endParaRPr lang="zh-TW" altLang="en-US">
               <a:latin typeface="Times New Roman" panose="02020603050405020304" pitchFamily="18" charset="0"/>
@@ -6644,7 +6644,7 @@
                 <a:cs typeface="Times New Roman" panose="02020603050405020304" pitchFamily="18" charset="0"/>
               </a:rPr>
               <a:pPr/>
-              <a:t>2024/1/24</a:t>
+              <a:t>2024/2/21</a:t>
             </a:fld>
             <a:endParaRPr lang="zh-TW" altLang="en-US">
               <a:latin typeface="Times New Roman" panose="02020603050405020304" pitchFamily="18" charset="0"/>
@@ -6905,7 +6905,7 @@
                 <a:cs typeface="Times New Roman" panose="02020603050405020304" pitchFamily="18" charset="0"/>
               </a:rPr>
               <a:pPr/>
-              <a:t>2024/1/24</a:t>
+              <a:t>2024/2/21</a:t>
             </a:fld>
             <a:endParaRPr lang="zh-TW" altLang="en-US">
               <a:latin typeface="Times New Roman" panose="02020603050405020304" pitchFamily="18" charset="0"/>
@@ -7212,7 +7212,7 @@
                 <a:cs typeface="Times New Roman" panose="02020603050405020304" pitchFamily="18" charset="0"/>
               </a:rPr>
               <a:pPr/>
-              <a:t>2024/1/24</a:t>
+              <a:t>2024/2/21</a:t>
             </a:fld>
             <a:endParaRPr lang="zh-TW" altLang="en-US">
               <a:latin typeface="Times New Roman" panose="02020603050405020304" pitchFamily="18" charset="0"/>
@@ -8161,7 +8161,7 @@
                 <a:cs typeface="Times New Roman" panose="02020603050405020304" pitchFamily="18" charset="0"/>
               </a:rPr>
               <a:pPr/>
-              <a:t>2024/1/23</a:t>
+              <a:t>2024/2/21</a:t>
             </a:fld>
             <a:endParaRPr lang="zh-TW" altLang="en-US">
               <a:latin typeface="Times New Roman" panose="02020603050405020304" pitchFamily="18" charset="0"/>

</xml_diff>